<commit_message>
Jan updates to precourse material and schedule
</commit_message>
<xml_diff>
--- a/pres-source/02-map-reduce.pptx
+++ b/pres-source/02-map-reduce.pptx
@@ -123,6 +123,36 @@
       </a:defRPr>
     </a:lvl9pPr>
   </p:defaultTextStyle>
+  <p:extLst>
+    <p:ext uri="{EFAFB233-063F-42B5-8137-9DF3F51BA10A}">
+      <p15:sldGuideLst xmlns:p15="http://schemas.microsoft.com/office/powerpoint/2012/main">
+        <p15:guide id="1" orient="horz" pos="2160">
+          <p15:clr>
+            <a:srgbClr val="A4A3A4"/>
+          </p15:clr>
+        </p15:guide>
+        <p15:guide id="2" pos="2880">
+          <p15:clr>
+            <a:srgbClr val="A4A3A4"/>
+          </p15:clr>
+        </p15:guide>
+      </p15:sldGuideLst>
+    </p:ext>
+    <p:ext uri="{2D200454-40CA-4A62-9FC3-DE9A4176ACB9}">
+      <p15:notesGuideLst xmlns:p15="http://schemas.microsoft.com/office/powerpoint/2012/main">
+        <p15:guide id="1" orient="horz" pos="2880">
+          <p15:clr>
+            <a:srgbClr val="A4A3A4"/>
+          </p15:clr>
+        </p15:guide>
+        <p15:guide id="2" pos="2160">
+          <p15:clr>
+            <a:srgbClr val="A4A3A4"/>
+          </p15:clr>
+        </p15:guide>
+      </p15:notesGuideLst>
+    </p:ext>
+  </p:extLst>
 </p:presentation>
 </file>
 
@@ -213,7 +243,7 @@
             <a:fld id="{7307762F-A706-E543-A832-3C298AA3103F}" type="datetimeFigureOut">
               <a:rPr lang="en-US" smtClean="0"/>
               <a:pPr/>
-              <a:t>05/12/17</a:t>
+              <a:t>1/4/19</a:t>
             </a:fld>
             <a:endParaRPr lang="en-US" dirty="0"/>
           </a:p>
@@ -277,38 +307,37 @@
           <a:p>
             <a:pPr lvl="0"/>
             <a:r>
-              <a:rPr lang="en-US" dirty="0" smtClean="0"/>
+              <a:rPr lang="en-US" dirty="0"/>
               <a:t>Click to edit Master text styles</a:t>
             </a:r>
           </a:p>
           <a:p>
             <a:pPr lvl="1"/>
             <a:r>
-              <a:rPr lang="en-US" dirty="0" smtClean="0"/>
+              <a:rPr lang="en-US" dirty="0"/>
               <a:t>Second level</a:t>
             </a:r>
           </a:p>
           <a:p>
             <a:pPr lvl="2"/>
             <a:r>
-              <a:rPr lang="en-US" dirty="0" smtClean="0"/>
+              <a:rPr lang="en-US" dirty="0"/>
               <a:t>Third level</a:t>
             </a:r>
           </a:p>
           <a:p>
             <a:pPr lvl="3"/>
             <a:r>
-              <a:rPr lang="en-US" dirty="0" smtClean="0"/>
+              <a:rPr lang="en-US" dirty="0"/>
               <a:t>Fourth level</a:t>
             </a:r>
           </a:p>
           <a:p>
             <a:pPr lvl="4"/>
             <a:r>
-              <a:rPr lang="en-US" dirty="0" smtClean="0"/>
+              <a:rPr lang="en-US" dirty="0"/>
               <a:t>Fifth level</a:t>
             </a:r>
-            <a:endParaRPr lang="en-US" dirty="0"/>
           </a:p>
         </p:txBody>
       </p:sp>
@@ -486,6 +515,94 @@
 </p:notesMaster>
 </file>
 
+<file path=ppt/notesSlides/notesSlide1.xml><?xml version="1.0" encoding="utf-8"?>
+<p:notes xmlns:a="http://schemas.openxmlformats.org/drawingml/2006/main" xmlns:r="http://schemas.openxmlformats.org/officeDocument/2006/relationships" xmlns:p="http://schemas.openxmlformats.org/presentationml/2006/main">
+  <p:cSld>
+    <p:spTree>
+      <p:nvGrpSpPr>
+        <p:cNvPr id="1" name=""/>
+        <p:cNvGrpSpPr/>
+        <p:nvPr/>
+      </p:nvGrpSpPr>
+      <p:grpSpPr>
+        <a:xfrm>
+          <a:off x="0" y="0"/>
+          <a:ext cx="0" cy="0"/>
+          <a:chOff x="0" y="0"/>
+          <a:chExt cx="0" cy="0"/>
+        </a:xfrm>
+      </p:grpSpPr>
+      <p:sp>
+        <p:nvSpPr>
+          <p:cNvPr id="2" name="Slide Image Placeholder 1"/>
+          <p:cNvSpPr>
+            <a:spLocks noGrp="1" noRot="1" noChangeAspect="1"/>
+          </p:cNvSpPr>
+          <p:nvPr>
+            <p:ph type="sldImg"/>
+          </p:nvPr>
+        </p:nvSpPr>
+        <p:spPr/>
+      </p:sp>
+      <p:sp>
+        <p:nvSpPr>
+          <p:cNvPr id="3" name="Notes Placeholder 2"/>
+          <p:cNvSpPr>
+            <a:spLocks noGrp="1"/>
+          </p:cNvSpPr>
+          <p:nvPr>
+            <p:ph type="body" idx="1"/>
+          </p:nvPr>
+        </p:nvSpPr>
+        <p:spPr/>
+        <p:txBody>
+          <a:bodyPr/>
+          <a:lstStyle/>
+          <a:p>
+            <a:r>
+              <a:rPr lang="en-US"/>
+              <a:t>see 06-additional tools</a:t>
+            </a:r>
+          </a:p>
+        </p:txBody>
+      </p:sp>
+      <p:sp>
+        <p:nvSpPr>
+          <p:cNvPr id="4" name="Slide Number Placeholder 3"/>
+          <p:cNvSpPr>
+            <a:spLocks noGrp="1"/>
+          </p:cNvSpPr>
+          <p:nvPr>
+            <p:ph type="sldNum" sz="quarter" idx="5"/>
+          </p:nvPr>
+        </p:nvSpPr>
+        <p:spPr/>
+        <p:txBody>
+          <a:bodyPr/>
+          <a:lstStyle/>
+          <a:p>
+            <a:fld id="{BC39F3E1-B436-EB4D-8332-DAA0486A7B2B}" type="slidenum">
+              <a:rPr lang="en-US" smtClean="0"/>
+              <a:pPr/>
+              <a:t>16</a:t>
+            </a:fld>
+            <a:endParaRPr lang="en-US" dirty="0"/>
+          </a:p>
+        </p:txBody>
+      </p:sp>
+    </p:spTree>
+    <p:extLst>
+      <p:ext uri="{BB962C8B-B14F-4D97-AF65-F5344CB8AC3E}">
+        <p14:creationId xmlns:p14="http://schemas.microsoft.com/office/powerpoint/2010/main" val="3384916545"/>
+      </p:ext>
+    </p:extLst>
+  </p:cSld>
+  <p:clrMapOvr>
+    <a:masterClrMapping/>
+  </p:clrMapOvr>
+</p:notes>
+</file>
+
 <file path=ppt/slideLayouts/slideLayout1.xml><?xml version="1.0" encoding="utf-8"?>
 <p:sldLayout xmlns:a="http://schemas.openxmlformats.org/drawingml/2006/main" xmlns:r="http://schemas.openxmlformats.org/officeDocument/2006/relationships" xmlns:p="http://schemas.openxmlformats.org/presentationml/2006/main" type="title" preserve="1">
   <p:cSld name="Title Slide">
@@ -524,10 +641,9 @@
           <a:lstStyle/>
           <a:p>
             <a:r>
-              <a:rPr lang="en-US" smtClean="0"/>
+              <a:rPr lang="en-US"/>
               <a:t>Click to edit Master title style</a:t>
             </a:r>
-            <a:endParaRPr lang="en-US"/>
           </a:p>
         </p:txBody>
       </p:sp>
@@ -643,10 +759,9 @@
           </a:lstStyle>
           <a:p>
             <a:r>
-              <a:rPr lang="en-US" smtClean="0"/>
+              <a:rPr lang="en-US"/>
               <a:t>Click to edit Master subtitle style</a:t>
             </a:r>
-            <a:endParaRPr lang="en-US"/>
           </a:p>
         </p:txBody>
       </p:sp>
@@ -696,10 +811,9 @@
           <a:lstStyle/>
           <a:p>
             <a:r>
-              <a:rPr lang="en-US" smtClean="0"/>
+              <a:rPr lang="en-US"/>
               <a:t>Click to edit Master title style</a:t>
             </a:r>
-            <a:endParaRPr lang="en-US"/>
           </a:p>
         </p:txBody>
       </p:sp>
@@ -720,38 +834,37 @@
           <a:p>
             <a:pPr lvl="0"/>
             <a:r>
-              <a:rPr lang="en-US" smtClean="0"/>
+              <a:rPr lang="en-US"/>
               <a:t>Click to edit Master text styles</a:t>
             </a:r>
           </a:p>
           <a:p>
             <a:pPr lvl="1"/>
             <a:r>
-              <a:rPr lang="en-US" smtClean="0"/>
+              <a:rPr lang="en-US"/>
               <a:t>Second level</a:t>
             </a:r>
           </a:p>
           <a:p>
             <a:pPr lvl="2"/>
             <a:r>
-              <a:rPr lang="en-US" smtClean="0"/>
+              <a:rPr lang="en-US"/>
               <a:t>Third level</a:t>
             </a:r>
           </a:p>
           <a:p>
             <a:pPr lvl="3"/>
             <a:r>
-              <a:rPr lang="en-US" smtClean="0"/>
+              <a:rPr lang="en-US"/>
               <a:t>Fourth level</a:t>
             </a:r>
           </a:p>
           <a:p>
             <a:pPr lvl="4"/>
             <a:r>
-              <a:rPr lang="en-US" smtClean="0"/>
+              <a:rPr lang="en-US"/>
               <a:t>Fifth level</a:t>
             </a:r>
-            <a:endParaRPr lang="en-US"/>
           </a:p>
         </p:txBody>
       </p:sp>
@@ -780,7 +893,7 @@
           <a:p>
             <a:fld id="{875CF0EB-321F-0749-B37A-89BBA859503C}" type="datetimeFigureOut">
               <a:rPr lang="en-US" smtClean="0"/>
-              <a:t>05/12/17</a:t>
+              <a:t>1/4/19</a:t>
             </a:fld>
             <a:endParaRPr lang="en-US"/>
           </a:p>
@@ -895,10 +1008,9 @@
           <a:lstStyle/>
           <a:p>
             <a:r>
-              <a:rPr lang="en-US" smtClean="0"/>
+              <a:rPr lang="en-US"/>
               <a:t>Click to edit Master title style</a:t>
             </a:r>
-            <a:endParaRPr lang="en-US"/>
           </a:p>
         </p:txBody>
       </p:sp>
@@ -924,38 +1036,37 @@
           <a:p>
             <a:pPr lvl="0"/>
             <a:r>
-              <a:rPr lang="en-US" smtClean="0"/>
+              <a:rPr lang="en-US"/>
               <a:t>Click to edit Master text styles</a:t>
             </a:r>
           </a:p>
           <a:p>
             <a:pPr lvl="1"/>
             <a:r>
-              <a:rPr lang="en-US" smtClean="0"/>
+              <a:rPr lang="en-US"/>
               <a:t>Second level</a:t>
             </a:r>
           </a:p>
           <a:p>
             <a:pPr lvl="2"/>
             <a:r>
-              <a:rPr lang="en-US" smtClean="0"/>
+              <a:rPr lang="en-US"/>
               <a:t>Third level</a:t>
             </a:r>
           </a:p>
           <a:p>
             <a:pPr lvl="3"/>
             <a:r>
-              <a:rPr lang="en-US" smtClean="0"/>
+              <a:rPr lang="en-US"/>
               <a:t>Fourth level</a:t>
             </a:r>
           </a:p>
           <a:p>
             <a:pPr lvl="4"/>
             <a:r>
-              <a:rPr lang="en-US" smtClean="0"/>
+              <a:rPr lang="en-US"/>
               <a:t>Fifth level</a:t>
             </a:r>
-            <a:endParaRPr lang="en-US"/>
           </a:p>
         </p:txBody>
       </p:sp>
@@ -984,7 +1095,7 @@
           <a:p>
             <a:fld id="{875CF0EB-321F-0749-B37A-89BBA859503C}" type="datetimeFigureOut">
               <a:rPr lang="en-US" smtClean="0"/>
-              <a:t>05/12/17</a:t>
+              <a:t>1/4/19</a:t>
             </a:fld>
             <a:endParaRPr lang="en-US"/>
           </a:p>
@@ -1094,10 +1205,9 @@
           <a:lstStyle/>
           <a:p>
             <a:r>
-              <a:rPr lang="en-US" smtClean="0"/>
+              <a:rPr lang="en-US"/>
               <a:t>Click to edit Master title style</a:t>
             </a:r>
-            <a:endParaRPr lang="en-US"/>
           </a:p>
         </p:txBody>
       </p:sp>
@@ -1118,38 +1228,37 @@
           <a:p>
             <a:pPr lvl="0"/>
             <a:r>
-              <a:rPr lang="en-US" smtClean="0"/>
+              <a:rPr lang="en-US"/>
               <a:t>Click to edit Master text styles</a:t>
             </a:r>
           </a:p>
           <a:p>
             <a:pPr lvl="1"/>
             <a:r>
-              <a:rPr lang="en-US" smtClean="0"/>
+              <a:rPr lang="en-US"/>
               <a:t>Second level</a:t>
             </a:r>
           </a:p>
           <a:p>
             <a:pPr lvl="2"/>
             <a:r>
-              <a:rPr lang="en-US" smtClean="0"/>
+              <a:rPr lang="en-US"/>
               <a:t>Third level</a:t>
             </a:r>
           </a:p>
           <a:p>
             <a:pPr lvl="3"/>
             <a:r>
-              <a:rPr lang="en-US" smtClean="0"/>
+              <a:rPr lang="en-US"/>
               <a:t>Fourth level</a:t>
             </a:r>
           </a:p>
           <a:p>
             <a:pPr lvl="4"/>
             <a:r>
-              <a:rPr lang="en-US" smtClean="0"/>
+              <a:rPr lang="en-US"/>
               <a:t>Fifth level</a:t>
             </a:r>
-            <a:endParaRPr lang="en-US"/>
           </a:p>
         </p:txBody>
       </p:sp>
@@ -1178,7 +1287,7 @@
           <a:p>
             <a:fld id="{875CF0EB-321F-0749-B37A-89BBA859503C}" type="datetimeFigureOut">
               <a:rPr lang="en-US" smtClean="0"/>
-              <a:t>05/12/17</a:t>
+              <a:t>1/4/19</a:t>
             </a:fld>
             <a:endParaRPr lang="en-US"/>
           </a:p>
@@ -1297,10 +1406,9 @@
           </a:lstStyle>
           <a:p>
             <a:r>
-              <a:rPr lang="en-US" smtClean="0"/>
+              <a:rPr lang="en-US"/>
               <a:t>Click to edit Master title style</a:t>
             </a:r>
-            <a:endParaRPr lang="en-US"/>
           </a:p>
         </p:txBody>
       </p:sp>
@@ -1417,7 +1525,7 @@
           <a:p>
             <a:pPr lvl="0"/>
             <a:r>
-              <a:rPr lang="en-US" smtClean="0"/>
+              <a:rPr lang="en-US"/>
               <a:t>Click to edit Master text styles</a:t>
             </a:r>
           </a:p>
@@ -1448,7 +1556,7 @@
           <a:p>
             <a:fld id="{875CF0EB-321F-0749-B37A-89BBA859503C}" type="datetimeFigureOut">
               <a:rPr lang="en-US" smtClean="0"/>
-              <a:t>05/12/17</a:t>
+              <a:t>1/4/19</a:t>
             </a:fld>
             <a:endParaRPr lang="en-US"/>
           </a:p>
@@ -1558,10 +1666,9 @@
           <a:lstStyle/>
           <a:p>
             <a:r>
-              <a:rPr lang="en-US" smtClean="0"/>
+              <a:rPr lang="en-US"/>
               <a:t>Click to edit Master title style</a:t>
             </a:r>
-            <a:endParaRPr lang="en-US"/>
           </a:p>
         </p:txBody>
       </p:sp>
@@ -1615,38 +1722,37 @@
           <a:p>
             <a:pPr lvl="0"/>
             <a:r>
-              <a:rPr lang="en-US" smtClean="0"/>
+              <a:rPr lang="en-US"/>
               <a:t>Click to edit Master text styles</a:t>
             </a:r>
           </a:p>
           <a:p>
             <a:pPr lvl="1"/>
             <a:r>
-              <a:rPr lang="en-US" smtClean="0"/>
+              <a:rPr lang="en-US"/>
               <a:t>Second level</a:t>
             </a:r>
           </a:p>
           <a:p>
             <a:pPr lvl="2"/>
             <a:r>
-              <a:rPr lang="en-US" smtClean="0"/>
+              <a:rPr lang="en-US"/>
               <a:t>Third level</a:t>
             </a:r>
           </a:p>
           <a:p>
             <a:pPr lvl="3"/>
             <a:r>
-              <a:rPr lang="en-US" smtClean="0"/>
+              <a:rPr lang="en-US"/>
               <a:t>Fourth level</a:t>
             </a:r>
           </a:p>
           <a:p>
             <a:pPr lvl="4"/>
             <a:r>
-              <a:rPr lang="en-US" smtClean="0"/>
+              <a:rPr lang="en-US"/>
               <a:t>Fifth level</a:t>
             </a:r>
-            <a:endParaRPr lang="en-US"/>
           </a:p>
         </p:txBody>
       </p:sp>
@@ -1700,38 +1806,37 @@
           <a:p>
             <a:pPr lvl="0"/>
             <a:r>
-              <a:rPr lang="en-US" smtClean="0"/>
+              <a:rPr lang="en-US"/>
               <a:t>Click to edit Master text styles</a:t>
             </a:r>
           </a:p>
           <a:p>
             <a:pPr lvl="1"/>
             <a:r>
-              <a:rPr lang="en-US" smtClean="0"/>
+              <a:rPr lang="en-US"/>
               <a:t>Second level</a:t>
             </a:r>
           </a:p>
           <a:p>
             <a:pPr lvl="2"/>
             <a:r>
-              <a:rPr lang="en-US" smtClean="0"/>
+              <a:rPr lang="en-US"/>
               <a:t>Third level</a:t>
             </a:r>
           </a:p>
           <a:p>
             <a:pPr lvl="3"/>
             <a:r>
-              <a:rPr lang="en-US" smtClean="0"/>
+              <a:rPr lang="en-US"/>
               <a:t>Fourth level</a:t>
             </a:r>
           </a:p>
           <a:p>
             <a:pPr lvl="4"/>
             <a:r>
-              <a:rPr lang="en-US" smtClean="0"/>
+              <a:rPr lang="en-US"/>
               <a:t>Fifth level</a:t>
             </a:r>
-            <a:endParaRPr lang="en-US"/>
           </a:p>
         </p:txBody>
       </p:sp>
@@ -1760,7 +1865,7 @@
           <a:p>
             <a:fld id="{875CF0EB-321F-0749-B37A-89BBA859503C}" type="datetimeFigureOut">
               <a:rPr lang="en-US" smtClean="0"/>
-              <a:t>05/12/17</a:t>
+              <a:t>1/4/19</a:t>
             </a:fld>
             <a:endParaRPr lang="en-US"/>
           </a:p>
@@ -1874,10 +1979,9 @@
           </a:lstStyle>
           <a:p>
             <a:r>
-              <a:rPr lang="en-US" smtClean="0"/>
+              <a:rPr lang="en-US"/>
               <a:t>Click to edit Master title style</a:t>
             </a:r>
-            <a:endParaRPr lang="en-US"/>
           </a:p>
         </p:txBody>
       </p:sp>
@@ -1940,7 +2044,7 @@
           <a:p>
             <a:pPr lvl="0"/>
             <a:r>
-              <a:rPr lang="en-US" smtClean="0"/>
+              <a:rPr lang="en-US"/>
               <a:t>Click to edit Master text styles</a:t>
             </a:r>
           </a:p>
@@ -1996,38 +2100,37 @@
           <a:p>
             <a:pPr lvl="0"/>
             <a:r>
-              <a:rPr lang="en-US" smtClean="0"/>
+              <a:rPr lang="en-US"/>
               <a:t>Click to edit Master text styles</a:t>
             </a:r>
           </a:p>
           <a:p>
             <a:pPr lvl="1"/>
             <a:r>
-              <a:rPr lang="en-US" smtClean="0"/>
+              <a:rPr lang="en-US"/>
               <a:t>Second level</a:t>
             </a:r>
           </a:p>
           <a:p>
             <a:pPr lvl="2"/>
             <a:r>
-              <a:rPr lang="en-US" smtClean="0"/>
+              <a:rPr lang="en-US"/>
               <a:t>Third level</a:t>
             </a:r>
           </a:p>
           <a:p>
             <a:pPr lvl="3"/>
             <a:r>
-              <a:rPr lang="en-US" smtClean="0"/>
+              <a:rPr lang="en-US"/>
               <a:t>Fourth level</a:t>
             </a:r>
           </a:p>
           <a:p>
             <a:pPr lvl="4"/>
             <a:r>
-              <a:rPr lang="en-US" smtClean="0"/>
+              <a:rPr lang="en-US"/>
               <a:t>Fifth level</a:t>
             </a:r>
-            <a:endParaRPr lang="en-US"/>
           </a:p>
         </p:txBody>
       </p:sp>
@@ -2090,7 +2193,7 @@
           <a:p>
             <a:pPr lvl="0"/>
             <a:r>
-              <a:rPr lang="en-US" smtClean="0"/>
+              <a:rPr lang="en-US"/>
               <a:t>Click to edit Master text styles</a:t>
             </a:r>
           </a:p>
@@ -2146,38 +2249,37 @@
           <a:p>
             <a:pPr lvl="0"/>
             <a:r>
-              <a:rPr lang="en-US" smtClean="0"/>
+              <a:rPr lang="en-US"/>
               <a:t>Click to edit Master text styles</a:t>
             </a:r>
           </a:p>
           <a:p>
             <a:pPr lvl="1"/>
             <a:r>
-              <a:rPr lang="en-US" smtClean="0"/>
+              <a:rPr lang="en-US"/>
               <a:t>Second level</a:t>
             </a:r>
           </a:p>
           <a:p>
             <a:pPr lvl="2"/>
             <a:r>
-              <a:rPr lang="en-US" smtClean="0"/>
+              <a:rPr lang="en-US"/>
               <a:t>Third level</a:t>
             </a:r>
           </a:p>
           <a:p>
             <a:pPr lvl="3"/>
             <a:r>
-              <a:rPr lang="en-US" smtClean="0"/>
+              <a:rPr lang="en-US"/>
               <a:t>Fourth level</a:t>
             </a:r>
           </a:p>
           <a:p>
             <a:pPr lvl="4"/>
             <a:r>
-              <a:rPr lang="en-US" smtClean="0"/>
+              <a:rPr lang="en-US"/>
               <a:t>Fifth level</a:t>
             </a:r>
-            <a:endParaRPr lang="en-US"/>
           </a:p>
         </p:txBody>
       </p:sp>
@@ -2206,7 +2308,7 @@
           <a:p>
             <a:fld id="{875CF0EB-321F-0749-B37A-89BBA859503C}" type="datetimeFigureOut">
               <a:rPr lang="en-US" smtClean="0"/>
-              <a:t>05/12/17</a:t>
+              <a:t>1/4/19</a:t>
             </a:fld>
             <a:endParaRPr lang="en-US"/>
           </a:p>
@@ -2316,10 +2418,9 @@
           <a:lstStyle/>
           <a:p>
             <a:r>
-              <a:rPr lang="en-US" smtClean="0"/>
+              <a:rPr lang="en-US"/>
               <a:t>Click to edit Master title style</a:t>
             </a:r>
-            <a:endParaRPr lang="en-US"/>
           </a:p>
         </p:txBody>
       </p:sp>
@@ -2348,7 +2449,7 @@
           <a:p>
             <a:fld id="{875CF0EB-321F-0749-B37A-89BBA859503C}" type="datetimeFigureOut">
               <a:rPr lang="en-US" smtClean="0"/>
-              <a:t>05/12/17</a:t>
+              <a:t>1/4/19</a:t>
             </a:fld>
             <a:endParaRPr lang="en-US"/>
           </a:p>
@@ -2467,7 +2568,7 @@
           <a:p>
             <a:fld id="{875CF0EB-321F-0749-B37A-89BBA859503C}" type="datetimeFigureOut">
               <a:rPr lang="en-US" smtClean="0"/>
-              <a:t>05/12/17</a:t>
+              <a:t>1/4/19</a:t>
             </a:fld>
             <a:endParaRPr lang="en-US"/>
           </a:p>
@@ -2586,10 +2687,9 @@
           </a:lstStyle>
           <a:p>
             <a:r>
-              <a:rPr lang="en-US" smtClean="0"/>
+              <a:rPr lang="en-US"/>
               <a:t>Click to edit Master title style</a:t>
             </a:r>
-            <a:endParaRPr lang="en-US"/>
           </a:p>
         </p:txBody>
       </p:sp>
@@ -2643,38 +2743,37 @@
           <a:p>
             <a:pPr lvl="0"/>
             <a:r>
-              <a:rPr lang="en-US" smtClean="0"/>
+              <a:rPr lang="en-US"/>
               <a:t>Click to edit Master text styles</a:t>
             </a:r>
           </a:p>
           <a:p>
             <a:pPr lvl="1"/>
             <a:r>
-              <a:rPr lang="en-US" smtClean="0"/>
+              <a:rPr lang="en-US"/>
               <a:t>Second level</a:t>
             </a:r>
           </a:p>
           <a:p>
             <a:pPr lvl="2"/>
             <a:r>
-              <a:rPr lang="en-US" smtClean="0"/>
+              <a:rPr lang="en-US"/>
               <a:t>Third level</a:t>
             </a:r>
           </a:p>
           <a:p>
             <a:pPr lvl="3"/>
             <a:r>
-              <a:rPr lang="en-US" smtClean="0"/>
+              <a:rPr lang="en-US"/>
               <a:t>Fourth level</a:t>
             </a:r>
           </a:p>
           <a:p>
             <a:pPr lvl="4"/>
             <a:r>
-              <a:rPr lang="en-US" smtClean="0"/>
+              <a:rPr lang="en-US"/>
               <a:t>Fifth level</a:t>
             </a:r>
-            <a:endParaRPr lang="en-US"/>
           </a:p>
         </p:txBody>
       </p:sp>
@@ -2737,7 +2836,7 @@
           <a:p>
             <a:pPr lvl="0"/>
             <a:r>
-              <a:rPr lang="en-US" smtClean="0"/>
+              <a:rPr lang="en-US"/>
               <a:t>Click to edit Master text styles</a:t>
             </a:r>
           </a:p>
@@ -2768,7 +2867,7 @@
           <a:p>
             <a:fld id="{875CF0EB-321F-0749-B37A-89BBA859503C}" type="datetimeFigureOut">
               <a:rPr lang="en-US" smtClean="0"/>
-              <a:t>05/12/17</a:t>
+              <a:t>1/4/19</a:t>
             </a:fld>
             <a:endParaRPr lang="en-US"/>
           </a:p>
@@ -2887,10 +2986,9 @@
           </a:lstStyle>
           <a:p>
             <a:r>
-              <a:rPr lang="en-US" smtClean="0"/>
+              <a:rPr lang="en-US"/>
               <a:t>Click to edit Master title style</a:t>
             </a:r>
-            <a:endParaRPr lang="en-US"/>
           </a:p>
         </p:txBody>
       </p:sp>
@@ -3014,7 +3112,7 @@
           <a:p>
             <a:pPr lvl="0"/>
             <a:r>
-              <a:rPr lang="en-US" smtClean="0"/>
+              <a:rPr lang="en-US"/>
               <a:t>Click to edit Master text styles</a:t>
             </a:r>
           </a:p>
@@ -3045,7 +3143,7 @@
           <a:p>
             <a:fld id="{875CF0EB-321F-0749-B37A-89BBA859503C}" type="datetimeFigureOut">
               <a:rPr lang="en-US" smtClean="0"/>
-              <a:t>05/12/17</a:t>
+              <a:t>1/4/19</a:t>
             </a:fld>
             <a:endParaRPr lang="en-US"/>
           </a:p>
@@ -3170,10 +3268,9 @@
           <a:lstStyle/>
           <a:p>
             <a:r>
-              <a:rPr lang="en-US" dirty="0" smtClean="0"/>
+              <a:rPr lang="en-US" dirty="0"/>
               <a:t>Click to edit Master title style</a:t>
             </a:r>
-            <a:endParaRPr lang="en-US" dirty="0"/>
           </a:p>
         </p:txBody>
       </p:sp>
@@ -3204,38 +3301,37 @@
           <a:p>
             <a:pPr lvl="0"/>
             <a:r>
-              <a:rPr lang="en-US" dirty="0" smtClean="0"/>
+              <a:rPr lang="en-US" dirty="0"/>
               <a:t>Click to edit Master text styles</a:t>
             </a:r>
           </a:p>
           <a:p>
             <a:pPr lvl="1"/>
             <a:r>
-              <a:rPr lang="en-US" dirty="0" smtClean="0"/>
+              <a:rPr lang="en-US" dirty="0"/>
               <a:t>Second level</a:t>
             </a:r>
           </a:p>
           <a:p>
             <a:pPr lvl="2"/>
             <a:r>
-              <a:rPr lang="en-US" dirty="0" smtClean="0"/>
+              <a:rPr lang="en-US" dirty="0"/>
               <a:t>Third level</a:t>
             </a:r>
           </a:p>
           <a:p>
             <a:pPr lvl="3"/>
             <a:r>
-              <a:rPr lang="en-US" dirty="0" smtClean="0"/>
+              <a:rPr lang="en-US" dirty="0"/>
               <a:t>Fourth level</a:t>
             </a:r>
           </a:p>
           <a:p>
             <a:pPr lvl="4"/>
             <a:r>
-              <a:rPr lang="en-US" dirty="0" smtClean="0"/>
+              <a:rPr lang="en-US" dirty="0"/>
               <a:t>Fifth level</a:t>
             </a:r>
-            <a:endParaRPr lang="en-US" dirty="0"/>
           </a:p>
         </p:txBody>
       </p:sp>
@@ -3261,14 +3357,14 @@
           </a:ln>
           <a:extLst>
             <a:ext uri="{909E8E84-426E-40dd-AFC4-6F175D3DCCD1}">
-              <a14:hiddenFill xmlns:a14="http://schemas.microsoft.com/office/drawing/2010/main">
+              <a14:hiddenFill xmlns:a14="http://schemas.microsoft.com/office/drawing/2010/main" xmlns="">
                 <a:solidFill>
                   <a:srgbClr val="FFFFFF"/>
                 </a:solidFill>
               </a14:hiddenFill>
             </a:ext>
             <a:ext uri="{91240B29-F687-4f45-9708-019B960494DF}">
-              <a14:hiddenLine xmlns:a14="http://schemas.microsoft.com/office/drawing/2010/main" w="9525">
+              <a14:hiddenLine xmlns:a14="http://schemas.microsoft.com/office/drawing/2010/main" xmlns="" w="9525">
                 <a:solidFill>
                   <a:srgbClr val="000000"/>
                 </a:solidFill>
@@ -3422,7 +3518,7 @@
               <a:defRPr/>
             </a:pPr>
             <a:r>
-              <a:rPr lang="en-US" sz="700" dirty="0" smtClean="0">
+              <a:rPr lang="en-US" sz="700" dirty="0">
                 <a:latin typeface="Montserrat"/>
               </a:rPr>
               <a:t>© Paul Fremantle 2015.  This work is licensed under a Creative Commons</a:t>
@@ -3433,55 +3529,55 @@
               <a:defRPr/>
             </a:pPr>
             <a:r>
-              <a:rPr lang="en-US" sz="700" dirty="0" smtClean="0">
+              <a:rPr lang="en-US" sz="700" dirty="0">
                 <a:latin typeface="Montserrat"/>
               </a:rPr>
               <a:t> Attribution-</a:t>
             </a:r>
             <a:r>
-              <a:rPr lang="en-US" sz="700" dirty="0" err="1" smtClean="0">
+              <a:rPr lang="en-US" sz="700" dirty="0" err="1">
                 <a:latin typeface="Montserrat"/>
               </a:rPr>
               <a:t>NonCommercial</a:t>
             </a:r>
             <a:r>
-              <a:rPr lang="en-US" sz="700" dirty="0" smtClean="0">
+              <a:rPr lang="en-US" sz="700" dirty="0">
                 <a:latin typeface="Montserrat"/>
               </a:rPr>
               <a:t>-</a:t>
             </a:r>
             <a:r>
-              <a:rPr lang="en-US" sz="700" dirty="0" err="1" smtClean="0">
+              <a:rPr lang="en-US" sz="700" dirty="0" err="1">
                 <a:latin typeface="Montserrat"/>
               </a:rPr>
               <a:t>ShareAlike</a:t>
             </a:r>
             <a:r>
-              <a:rPr lang="en-US" sz="700" dirty="0" smtClean="0">
+              <a:rPr lang="en-US" sz="700" dirty="0">
                 <a:latin typeface="Montserrat"/>
               </a:rPr>
               <a:t> 4.0 International License</a:t>
             </a:r>
             <a:br>
-              <a:rPr lang="en-US" sz="700" dirty="0" smtClean="0">
+              <a:rPr lang="en-US" sz="700" dirty="0">
                 <a:latin typeface="Montserrat"/>
               </a:rPr>
             </a:br>
             <a:r>
-              <a:rPr lang="en-US" sz="700" dirty="0" smtClean="0">
+              <a:rPr lang="en-US" sz="700" dirty="0">
                 <a:latin typeface="Montserrat"/>
               </a:rPr>
               <a:t>See  </a:t>
             </a:r>
             <a:r>
-              <a:rPr lang="en-US" sz="700" dirty="0" smtClean="0">
+              <a:rPr lang="en-US" sz="700" dirty="0">
                 <a:latin typeface="Montserrat"/>
                 <a:hlinkClick r:id="rId13"/>
               </a:rPr>
               <a:t>http://creativecommons.org/licenses/by-nc-sa/4.0/</a:t>
             </a:r>
             <a:r>
-              <a:rPr lang="en-US" sz="700" dirty="0" smtClean="0">
+              <a:rPr lang="en-US" sz="700" dirty="0">
                 <a:latin typeface="Montserrat"/>
               </a:rPr>
               <a:t> </a:t>
@@ -3822,14 +3918,14 @@
           <a:noFill/>
           <a:extLst>
             <a:ext uri="{909E8E84-426E-40dd-AFC4-6F175D3DCCD1}">
-              <a14:hiddenFill xmlns:a14="http://schemas.microsoft.com/office/drawing/2010/main">
+              <a14:hiddenFill xmlns:a14="http://schemas.microsoft.com/office/drawing/2010/main" xmlns="">
                 <a:solidFill>
                   <a:srgbClr val="FFFFFF"/>
                 </a:solidFill>
               </a14:hiddenFill>
             </a:ext>
             <a:ext uri="{91240B29-F687-4f45-9708-019B960494DF}">
-              <a14:hiddenLine xmlns:a14="http://schemas.microsoft.com/office/drawing/2010/main" w="9525">
+              <a14:hiddenLine xmlns:a14="http://schemas.microsoft.com/office/drawing/2010/main" xmlns="" w="9525">
                 <a:solidFill>
                   <a:srgbClr val="000000"/>
                 </a:solidFill>
@@ -3851,7 +3947,7 @@
           <a:p>
             <a:pPr eaLnBrk="1" hangingPunct="1"/>
             <a:r>
-              <a:rPr lang="en-US" sz="4000" dirty="0" smtClean="0">
+              <a:rPr lang="en-US" sz="4000" dirty="0">
                 <a:ea typeface="ヒラギノ角ゴ ProN W3" charset="0"/>
                 <a:cs typeface="ヒラギノ角ゴ ProN W3" charset="0"/>
               </a:rPr>
@@ -3874,21 +3970,6 @@
   <p:clrMapOvr>
     <a:masterClrMapping/>
   </p:clrMapOvr>
-  <mc:AlternateContent xmlns:mc="http://schemas.openxmlformats.org/markup-compatibility/2006" xmlns:p14="http://schemas.microsoft.com/office/powerpoint/2010/main">
-    <mc:Choice Requires="p14">
-      <p:transition spd="slow" p14:dur="2000"/>
-    </mc:Choice>
-    <mc:Fallback xmlns="">
-      <p:transition xmlns:p14="http://schemas.microsoft.com/office/powerpoint/2010/main" spd="slow"/>
-    </mc:Fallback>
-  </mc:AlternateContent>
-  <p:timing>
-    <p:tnLst>
-      <p:par>
-        <p:cTn xmlns:p14="http://schemas.microsoft.com/office/powerpoint/2010/main" id="1" dur="indefinite" restart="never" nodeType="tmRoot"/>
-      </p:par>
-    </p:tnLst>
-  </p:timing>
 </p:sld>
 </file>
 
@@ -3925,10 +4006,9 @@
           <a:lstStyle/>
           <a:p>
             <a:r>
-              <a:rPr lang="en-US" dirty="0" smtClean="0"/>
+              <a:rPr lang="en-US" dirty="0"/>
               <a:t>Map/Shuffle/Reduce</a:t>
             </a:r>
-            <a:endParaRPr lang="en-US" dirty="0"/>
           </a:p>
         </p:txBody>
       </p:sp>
@@ -4075,10 +4155,9 @@
           <a:lstStyle/>
           <a:p>
             <a:r>
-              <a:rPr lang="en-US" dirty="0" smtClean="0"/>
+              <a:rPr lang="en-US" dirty="0"/>
               <a:t>Map Reduce in Real Life</a:t>
             </a:r>
-            <a:endParaRPr lang="en-US" dirty="0"/>
           </a:p>
         </p:txBody>
       </p:sp>
@@ -4100,84 +4179,84 @@
           <a:lstStyle/>
           <a:p>
             <a:r>
-              <a:rPr lang="en-US" dirty="0" err="1" smtClean="0"/>
+              <a:rPr lang="en-US" dirty="0" err="1"/>
               <a:t>Analysing</a:t>
             </a:r>
             <a:r>
-              <a:rPr lang="en-US" dirty="0" smtClean="0"/>
+              <a:rPr lang="en-US" dirty="0"/>
               <a:t> web logs</a:t>
             </a:r>
           </a:p>
           <a:p>
             <a:pPr lvl="1"/>
             <a:r>
-              <a:rPr lang="en-US" dirty="0" err="1" smtClean="0"/>
+              <a:rPr lang="en-US" dirty="0" err="1"/>
               <a:t>Summarise</a:t>
             </a:r>
             <a:r>
-              <a:rPr lang="en-US" dirty="0" smtClean="0"/>
+              <a:rPr lang="en-US" dirty="0"/>
               <a:t> by user / cookie</a:t>
             </a:r>
           </a:p>
           <a:p>
             <a:pPr lvl="1"/>
             <a:r>
-              <a:rPr lang="en-US" dirty="0" smtClean="0"/>
+              <a:rPr lang="en-US" dirty="0"/>
               <a:t>Then aggregate to identify who did what</a:t>
             </a:r>
           </a:p>
           <a:p>
             <a:r>
-              <a:rPr lang="en-US" dirty="0" err="1" smtClean="0"/>
+              <a:rPr lang="en-US" dirty="0" err="1"/>
               <a:t>Analysing</a:t>
             </a:r>
             <a:r>
-              <a:rPr lang="en-US" dirty="0" smtClean="0"/>
+              <a:rPr lang="en-US" dirty="0"/>
               <a:t> twitter data</a:t>
             </a:r>
           </a:p>
           <a:p>
             <a:pPr lvl="1"/>
             <a:r>
-              <a:rPr lang="en-US" dirty="0" smtClean="0"/>
+              <a:rPr lang="en-US" dirty="0"/>
               <a:t>Who </a:t>
             </a:r>
             <a:r>
-              <a:rPr lang="en-US" dirty="0" err="1" smtClean="0"/>
+              <a:rPr lang="en-US" dirty="0" err="1"/>
               <a:t>retweeted</a:t>
             </a:r>
-            <a:endParaRPr lang="en-US" dirty="0" smtClean="0"/>
+            <a:endParaRPr lang="en-US" dirty="0"/>
           </a:p>
           <a:p>
             <a:pPr lvl="1"/>
             <a:r>
-              <a:rPr lang="en-US" dirty="0" smtClean="0"/>
+              <a:rPr lang="en-US" dirty="0"/>
               <a:t>Who was </a:t>
             </a:r>
             <a:r>
-              <a:rPr lang="en-US" dirty="0" err="1" smtClean="0"/>
+              <a:rPr lang="en-US" dirty="0" err="1"/>
               <a:t>retweeted</a:t>
             </a:r>
             <a:r>
-              <a:rPr lang="en-US" dirty="0" smtClean="0"/>
+              <a:rPr lang="en-US" dirty="0"/>
               <a:t> the most</a:t>
             </a:r>
           </a:p>
           <a:p>
             <a:r>
-              <a:rPr lang="en-US" dirty="0" smtClean="0"/>
+              <a:rPr lang="en-US" dirty="0"/>
               <a:t>Almost all big data problems can be re-factored into Map Reduce</a:t>
             </a:r>
           </a:p>
           <a:p>
             <a:pPr lvl="1"/>
             <a:r>
-              <a:rPr lang="en-US" dirty="0" smtClean="0"/>
+              <a:rPr lang="en-US" dirty="0"/>
               <a:t>Some more efficiently than others</a:t>
             </a:r>
           </a:p>
           <a:p>
-            <a:endParaRPr lang="en-US" dirty="0" smtClean="0"/>
+            <a:endParaRPr lang="en-US" dirty="0"/>
           </a:p>
           <a:p>
             <a:pPr lvl="1"/>
@@ -4231,10 +4310,9 @@
           <a:lstStyle/>
           <a:p>
             <a:r>
-              <a:rPr lang="en-US" dirty="0" smtClean="0"/>
+              <a:rPr lang="en-US" dirty="0"/>
               <a:t>Tuning</a:t>
             </a:r>
-            <a:endParaRPr lang="en-US" dirty="0"/>
           </a:p>
         </p:txBody>
       </p:sp>
@@ -4254,38 +4332,36 @@
           <a:lstStyle/>
           <a:p>
             <a:r>
-              <a:rPr lang="en-US" dirty="0" smtClean="0"/>
+              <a:rPr lang="en-US" dirty="0"/>
               <a:t>Fault tolerance</a:t>
             </a:r>
           </a:p>
           <a:p>
             <a:pPr lvl="1"/>
             <a:r>
-              <a:rPr lang="en-US" dirty="0" smtClean="0"/>
+              <a:rPr lang="en-US" dirty="0"/>
               <a:t>Simply re-execute work that fails</a:t>
             </a:r>
           </a:p>
           <a:p>
             <a:r>
-              <a:rPr lang="en-US" dirty="0" smtClean="0"/>
+              <a:rPr lang="en-US" dirty="0"/>
               <a:t>Performance:</a:t>
             </a:r>
-            <a:endParaRPr lang="en-US" dirty="0"/>
           </a:p>
           <a:p>
             <a:pPr lvl="1"/>
             <a:r>
-              <a:rPr lang="en-US" dirty="0" smtClean="0"/>
+              <a:rPr lang="en-US" dirty="0"/>
               <a:t>Partitioning the data </a:t>
             </a:r>
           </a:p>
           <a:p>
             <a:pPr lvl="1"/>
             <a:r>
-              <a:rPr lang="en-US" dirty="0" smtClean="0"/>
+              <a:rPr lang="en-US" dirty="0"/>
               <a:t>Moving the work to near the data</a:t>
             </a:r>
-            <a:endParaRPr lang="en-US" dirty="0"/>
           </a:p>
         </p:txBody>
       </p:sp>
@@ -4335,11 +4411,11 @@
           <a:lstStyle/>
           <a:p>
             <a:r>
-              <a:rPr lang="en-US" dirty="0" smtClean="0"/>
+              <a:rPr lang="en-US" dirty="0"/>
               <a:t>Apache </a:t>
             </a:r>
             <a:r>
-              <a:rPr lang="en-US" dirty="0" err="1" smtClean="0"/>
+              <a:rPr lang="en-US" dirty="0" err="1"/>
               <a:t>Hadoop</a:t>
             </a:r>
             <a:endParaRPr lang="en-US" dirty="0"/>
@@ -4364,60 +4440,59 @@
           <a:lstStyle/>
           <a:p>
             <a:r>
-              <a:rPr lang="en-US" dirty="0" smtClean="0"/>
+              <a:rPr lang="en-US" dirty="0"/>
               <a:t>The most famous and popular </a:t>
             </a:r>
             <a:br>
-              <a:rPr lang="en-US" dirty="0" smtClean="0"/>
+              <a:rPr lang="en-US" dirty="0"/>
             </a:br>
             <a:r>
-              <a:rPr lang="en-US" dirty="0" smtClean="0"/>
+              <a:rPr lang="en-US" dirty="0"/>
               <a:t>Map Reduce framework</a:t>
             </a:r>
           </a:p>
           <a:p>
             <a:pPr lvl="1"/>
             <a:r>
-              <a:rPr lang="en-US" dirty="0" smtClean="0"/>
+              <a:rPr lang="en-US" dirty="0"/>
               <a:t>Open Source</a:t>
             </a:r>
           </a:p>
           <a:p>
             <a:pPr lvl="2"/>
             <a:r>
-              <a:rPr lang="en-US" dirty="0" smtClean="0"/>
+              <a:rPr lang="en-US" dirty="0"/>
               <a:t>Written in Java, but supports other languages</a:t>
             </a:r>
           </a:p>
           <a:p>
             <a:pPr lvl="1"/>
             <a:r>
-              <a:rPr lang="en-US" dirty="0" smtClean="0"/>
+              <a:rPr lang="en-US" dirty="0"/>
               <a:t>Runs Map Reduce workloads across a cloud or cluster of machines</a:t>
             </a:r>
           </a:p>
           <a:p>
             <a:pPr lvl="1"/>
             <a:r>
-              <a:rPr lang="en-US" dirty="0" smtClean="0"/>
+              <a:rPr lang="en-US" dirty="0"/>
               <a:t>Supports a distributed </a:t>
             </a:r>
             <a:r>
-              <a:rPr lang="en-US" dirty="0" err="1" smtClean="0"/>
+              <a:rPr lang="en-US" dirty="0" err="1"/>
               <a:t>filesystem</a:t>
             </a:r>
             <a:r>
-              <a:rPr lang="en-US" dirty="0" smtClean="0"/>
+              <a:rPr lang="en-US" dirty="0"/>
               <a:t> to store data for these jobs</a:t>
             </a:r>
           </a:p>
           <a:p>
             <a:pPr lvl="1"/>
             <a:r>
-              <a:rPr lang="en-US" dirty="0" smtClean="0"/>
+              <a:rPr lang="en-US" dirty="0"/>
               <a:t>Provides reliability when servers in the cluster fail</a:t>
             </a:r>
-            <a:endParaRPr lang="en-US" dirty="0"/>
           </a:p>
         </p:txBody>
       </p:sp>
@@ -4467,11 +4542,11 @@
           <a:lstStyle/>
           <a:p>
             <a:r>
-              <a:rPr lang="en-US" dirty="0" smtClean="0"/>
+              <a:rPr lang="en-US" dirty="0"/>
               <a:t>Components of </a:t>
             </a:r>
             <a:r>
-              <a:rPr lang="en-US" dirty="0" err="1" smtClean="0"/>
+              <a:rPr lang="en-US" dirty="0" err="1"/>
               <a:t>Hadoop</a:t>
             </a:r>
             <a:endParaRPr lang="en-US" dirty="0"/>
@@ -4513,11 +4588,11 @@
           <a:p>
             <a:pPr algn="ctr"/>
             <a:r>
-              <a:rPr lang="en-US" dirty="0" err="1" smtClean="0"/>
+              <a:rPr lang="en-US" dirty="0" err="1"/>
               <a:t>Hadoop</a:t>
             </a:r>
             <a:r>
-              <a:rPr lang="en-US" dirty="0" smtClean="0"/>
+              <a:rPr lang="en-US" dirty="0"/>
               <a:t> Distributed File System (HDFS)</a:t>
             </a:r>
           </a:p>
@@ -4528,7 +4603,7 @@
           <a:p>
             <a:pPr algn="ctr"/>
             <a:r>
-              <a:rPr lang="en-US" dirty="0" smtClean="0"/>
+              <a:rPr lang="en-US" dirty="0"/>
               <a:t>Redundant Reliable Distributed File System</a:t>
             </a:r>
           </a:p>
@@ -4569,14 +4644,14 @@
           <a:p>
             <a:pPr algn="ctr"/>
             <a:r>
-              <a:rPr lang="en-US" dirty="0" smtClean="0"/>
+              <a:rPr lang="en-US" dirty="0"/>
               <a:t>YARN (Yet Another Resource Negotiator)</a:t>
             </a:r>
           </a:p>
           <a:p>
             <a:pPr algn="ctr"/>
             <a:r>
-              <a:rPr lang="en-US" dirty="0" smtClean="0"/>
+              <a:rPr lang="en-US" dirty="0"/>
               <a:t>Cluster Resource Management</a:t>
             </a:r>
           </a:p>
@@ -4617,7 +4692,7 @@
           <a:p>
             <a:pPr algn="ctr"/>
             <a:r>
-              <a:rPr lang="en-US" dirty="0" smtClean="0"/>
+              <a:rPr lang="en-US" dirty="0"/>
               <a:t>Map Reduce or Other Workloads</a:t>
             </a:r>
           </a:p>
@@ -4628,22 +4703,22 @@
           <a:p>
             <a:pPr algn="ctr"/>
             <a:r>
-              <a:rPr lang="en-US" dirty="0" smtClean="0"/>
+              <a:rPr lang="en-US" dirty="0"/>
               <a:t>Java, </a:t>
             </a:r>
             <a:r>
-              <a:rPr lang="en-US" dirty="0" err="1" smtClean="0"/>
+              <a:rPr lang="en-US" dirty="0" err="1"/>
               <a:t>Scala</a:t>
             </a:r>
             <a:r>
-              <a:rPr lang="en-US" dirty="0" smtClean="0"/>
+              <a:rPr lang="en-US" dirty="0"/>
               <a:t>, Python, Apache Pig, Apache Hive, </a:t>
             </a:r>
             <a:r>
-              <a:rPr lang="en-US" dirty="0" err="1" smtClean="0"/>
+              <a:rPr lang="en-US" dirty="0" err="1"/>
               <a:t>etc</a:t>
             </a:r>
-            <a:endParaRPr lang="en-US" dirty="0" smtClean="0"/>
+            <a:endParaRPr lang="en-US" dirty="0"/>
           </a:p>
         </p:txBody>
       </p:sp>
@@ -4693,53 +4768,52 @@
           <a:lstStyle/>
           <a:p>
             <a:r>
-              <a:rPr lang="en-US" dirty="0" smtClean="0"/>
+              <a:rPr lang="en-US" dirty="0"/>
               <a:t>Summary</a:t>
             </a:r>
+          </a:p>
+        </p:txBody>
+      </p:sp>
+      <p:sp>
+        <p:nvSpPr>
+          <p:cNvPr id="3" name="Content Placeholder 2"/>
+          <p:cNvSpPr>
+            <a:spLocks noGrp="1"/>
+          </p:cNvSpPr>
+          <p:nvPr>
+            <p:ph idx="1"/>
+          </p:nvPr>
+        </p:nvSpPr>
+        <p:spPr/>
+        <p:txBody>
+          <a:bodyPr/>
+          <a:lstStyle/>
+          <a:p>
+            <a:r>
+              <a:rPr lang="en-US" dirty="0"/>
+              <a:t>Understanding the Map Reduce Model</a:t>
+            </a:r>
+          </a:p>
+          <a:p>
+            <a:r>
+              <a:rPr lang="en-US" dirty="0"/>
+              <a:t>How is it implemented in </a:t>
+            </a:r>
+            <a:r>
+              <a:rPr lang="en-US" dirty="0" err="1"/>
+              <a:t>Hadoop</a:t>
+            </a:r>
             <a:endParaRPr lang="en-US" dirty="0"/>
           </a:p>
-        </p:txBody>
-      </p:sp>
-      <p:sp>
-        <p:nvSpPr>
-          <p:cNvPr id="3" name="Content Placeholder 2"/>
-          <p:cNvSpPr>
-            <a:spLocks noGrp="1"/>
-          </p:cNvSpPr>
-          <p:nvPr>
-            <p:ph idx="1"/>
-          </p:nvPr>
-        </p:nvSpPr>
-        <p:spPr/>
-        <p:txBody>
-          <a:bodyPr/>
-          <a:lstStyle/>
-          <a:p>
-            <a:r>
-              <a:rPr lang="en-US" dirty="0" smtClean="0"/>
-              <a:t>Understanding the Map Reduce Model</a:t>
-            </a:r>
-          </a:p>
-          <a:p>
-            <a:r>
-              <a:rPr lang="en-US" dirty="0" smtClean="0"/>
-              <a:t>How is it implemented in </a:t>
-            </a:r>
-            <a:r>
-              <a:rPr lang="en-US" dirty="0" err="1" smtClean="0"/>
-              <a:t>Hadoop</a:t>
-            </a:r>
-            <a:endParaRPr lang="en-US" dirty="0" smtClean="0"/>
-          </a:p>
-          <a:p>
-            <a:r>
-              <a:rPr lang="en-US" dirty="0" smtClean="0"/>
+          <a:p>
+            <a:r>
+              <a:rPr lang="en-US" dirty="0"/>
               <a:t>HDFS</a:t>
             </a:r>
           </a:p>
           <a:p>
             <a:r>
-              <a:rPr lang="en-US" dirty="0" smtClean="0"/>
+              <a:rPr lang="en-US" dirty="0"/>
               <a:t>Yarn</a:t>
             </a:r>
           </a:p>
@@ -4791,10 +4865,9 @@
           <a:lstStyle/>
           <a:p>
             <a:r>
-              <a:rPr lang="en-US" dirty="0" smtClean="0"/>
+              <a:rPr lang="en-US" dirty="0"/>
               <a:t>Questions?</a:t>
             </a:r>
-            <a:endParaRPr lang="en-US" dirty="0"/>
           </a:p>
         </p:txBody>
       </p:sp>
@@ -4842,14 +4915,14 @@
           <a:noFill/>
           <a:extLst>
             <a:ext uri="{909E8E84-426E-40dd-AFC4-6F175D3DCCD1}">
-              <a14:hiddenFill xmlns:a14="http://schemas.microsoft.com/office/drawing/2010/main">
+              <a14:hiddenFill xmlns:a14="http://schemas.microsoft.com/office/drawing/2010/main" xmlns="">
                 <a:solidFill>
                   <a:srgbClr val="FFFFFF"/>
                 </a:solidFill>
               </a14:hiddenFill>
             </a:ext>
             <a:ext uri="{91240B29-F687-4f45-9708-019B960494DF}">
-              <a14:hiddenLine xmlns:a14="http://schemas.microsoft.com/office/drawing/2010/main" w="9525">
+              <a14:hiddenLine xmlns:a14="http://schemas.microsoft.com/office/drawing/2010/main" xmlns="" w="9525">
                 <a:solidFill>
                   <a:srgbClr val="000000"/>
                 </a:solidFill>
@@ -4870,16 +4943,12 @@
           <a:p>
             <a:pPr eaLnBrk="1" hangingPunct="1"/>
             <a:r>
-              <a:rPr lang="en-US" dirty="0" smtClean="0">
+              <a:rPr lang="en-US" dirty="0">
                 <a:ea typeface="ヒラギノ角ゴ ProN W3" charset="0"/>
                 <a:cs typeface="ヒラギノ角ゴ ProN W3" charset="0"/>
               </a:rPr>
               <a:t>Contents</a:t>
             </a:r>
-            <a:endParaRPr lang="en-US" dirty="0">
-              <a:ea typeface="ヒラギノ角ゴ ProN W3" charset="0"/>
-              <a:cs typeface="ヒラギノ角ゴ ProN W3" charset="0"/>
-            </a:endParaRPr>
           </a:p>
         </p:txBody>
       </p:sp>
@@ -4897,14 +4966,14 @@
           <a:noFill/>
           <a:extLst>
             <a:ext uri="{909E8E84-426E-40dd-AFC4-6F175D3DCCD1}">
-              <a14:hiddenFill xmlns:a14="http://schemas.microsoft.com/office/drawing/2010/main">
+              <a14:hiddenFill xmlns:a14="http://schemas.microsoft.com/office/drawing/2010/main" xmlns="">
                 <a:solidFill>
                   <a:srgbClr val="FFFFFF"/>
                 </a:solidFill>
               </a14:hiddenFill>
             </a:ext>
             <a:ext uri="{91240B29-F687-4f45-9708-019B960494DF}">
-              <a14:hiddenLine xmlns:a14="http://schemas.microsoft.com/office/drawing/2010/main" w="9525">
+              <a14:hiddenLine xmlns:a14="http://schemas.microsoft.com/office/drawing/2010/main" xmlns="" w="9525">
                 <a:solidFill>
                   <a:srgbClr val="000000"/>
                 </a:solidFill>
@@ -4926,7 +4995,7 @@
           <a:p>
             <a:pPr eaLnBrk="1" hangingPunct="1"/>
             <a:r>
-              <a:rPr lang="en-US" dirty="0" smtClean="0">
+              <a:rPr lang="en-US" dirty="0">
                 <a:ea typeface="ヒラギノ角ゴ ProN W3" charset="0"/>
                 <a:cs typeface="ヒラギノ角ゴ ProN W3" charset="0"/>
               </a:rPr>
@@ -4936,72 +5005,61 @@
           <a:p>
             <a:pPr lvl="1"/>
             <a:r>
-              <a:rPr lang="en-US" dirty="0" smtClean="0">
+              <a:rPr lang="en-US" dirty="0">
                 <a:ea typeface="ヒラギノ角ゴ ProN W3" charset="0"/>
                 <a:cs typeface="ヒラギノ角ゴ ProN W3" charset="0"/>
               </a:rPr>
               <a:t>Functional programming patterns applied for scalability</a:t>
             </a:r>
+          </a:p>
+          <a:p>
+            <a:r>
+              <a:rPr lang="en-US" dirty="0" err="1">
+                <a:ea typeface="ヒラギノ角ゴ ProN W3" charset="0"/>
+                <a:cs typeface="ヒラギノ角ゴ ProN W3" charset="0"/>
+              </a:rPr>
+              <a:t>Hadoop</a:t>
+            </a:r>
             <a:endParaRPr lang="en-US" dirty="0">
               <a:ea typeface="ヒラギノ角ゴ ProN W3" charset="0"/>
               <a:cs typeface="ヒラギノ角ゴ ProN W3" charset="0"/>
             </a:endParaRPr>
           </a:p>
           <a:p>
-            <a:r>
-              <a:rPr lang="en-US" dirty="0" err="1" smtClean="0">
+            <a:pPr lvl="1"/>
+            <a:r>
+              <a:rPr lang="en-US" dirty="0">
+                <a:ea typeface="ヒラギノ角ゴ ProN W3" charset="0"/>
+                <a:cs typeface="ヒラギノ角ゴ ProN W3" charset="0"/>
+              </a:rPr>
+              <a:t>Map-reduce in </a:t>
+            </a:r>
+            <a:r>
+              <a:rPr lang="en-US" dirty="0" err="1">
                 <a:ea typeface="ヒラギノ角ゴ ProN W3" charset="0"/>
                 <a:cs typeface="ヒラギノ角ゴ ProN W3" charset="0"/>
               </a:rPr>
               <a:t>Hadoop</a:t>
             </a:r>
-            <a:endParaRPr lang="en-US" dirty="0" smtClean="0">
+            <a:endParaRPr lang="en-US" dirty="0">
               <a:ea typeface="ヒラギノ角ゴ ProN W3" charset="0"/>
               <a:cs typeface="ヒラギノ角ゴ ProN W3" charset="0"/>
             </a:endParaRPr>
           </a:p>
           <a:p>
-            <a:pPr lvl="1"/>
+            <a:pPr lvl="2"/>
             <a:r>
               <a:rPr lang="en-US" dirty="0">
                 <a:ea typeface="ヒラギノ角ゴ ProN W3" charset="0"/>
                 <a:cs typeface="ヒラギノ角ゴ ProN W3" charset="0"/>
               </a:rPr>
-              <a:t>Map-</a:t>
-            </a:r>
-            <a:r>
-              <a:rPr lang="en-US" dirty="0" smtClean="0">
-                <a:ea typeface="ヒラギノ角ゴ ProN W3" charset="0"/>
-                <a:cs typeface="ヒラギノ角ゴ ProN W3" charset="0"/>
-              </a:rPr>
-              <a:t>reduce in </a:t>
-            </a:r>
-            <a:r>
-              <a:rPr lang="en-US" dirty="0" err="1" smtClean="0">
-                <a:ea typeface="ヒラギノ角ゴ ProN W3" charset="0"/>
-                <a:cs typeface="ヒラギノ角ゴ ProN W3" charset="0"/>
-              </a:rPr>
-              <a:t>Hadoop</a:t>
-            </a:r>
-            <a:endParaRPr lang="en-US" dirty="0" smtClean="0">
-              <a:ea typeface="ヒラギノ角ゴ ProN W3" charset="0"/>
-              <a:cs typeface="ヒラギノ角ゴ ProN W3" charset="0"/>
-            </a:endParaRPr>
+              <a:t>Python</a:t>
+            </a:r>
           </a:p>
           <a:p>
             <a:pPr lvl="2"/>
             <a:r>
-              <a:rPr lang="en-US" dirty="0" smtClean="0">
-                <a:ea typeface="ヒラギノ角ゴ ProN W3" charset="0"/>
-                <a:cs typeface="ヒラギノ角ゴ ProN W3" charset="0"/>
-              </a:rPr>
-              <a:t>Python</a:t>
-            </a:r>
-          </a:p>
-          <a:p>
-            <a:pPr lvl="2"/>
-            <a:r>
-              <a:rPr lang="en-US" dirty="0" smtClean="0">
+              <a:rPr lang="en-US" dirty="0">
                 <a:ea typeface="ヒラギノ角ゴ ProN W3" charset="0"/>
                 <a:cs typeface="ヒラギノ角ゴ ProN W3" charset="0"/>
               </a:rPr>
@@ -5011,7 +5069,7 @@
           <a:p>
             <a:pPr lvl="1"/>
             <a:r>
-              <a:rPr lang="en-US" dirty="0" smtClean="0">
+              <a:rPr lang="en-US" dirty="0">
                 <a:ea typeface="ヒラギノ角ゴ ProN W3" charset="0"/>
                 <a:cs typeface="ヒラギノ角ゴ ProN W3" charset="0"/>
               </a:rPr>
@@ -5021,7 +5079,7 @@
           <a:p>
             <a:pPr lvl="1"/>
             <a:r>
-              <a:rPr lang="en-US" dirty="0" smtClean="0">
+              <a:rPr lang="en-US" dirty="0">
                 <a:ea typeface="ヒラギノ角ゴ ProN W3" charset="0"/>
                 <a:cs typeface="ヒラギノ角ゴ ProN W3" charset="0"/>
               </a:rPr>
@@ -5031,7 +5089,7 @@
           <a:p>
             <a:pPr lvl="1"/>
             <a:r>
-              <a:rPr lang="en-US" dirty="0" smtClean="0">
+              <a:rPr lang="en-US" dirty="0">
                 <a:ea typeface="ヒラギノ角ゴ ProN W3" charset="0"/>
                 <a:cs typeface="ヒラギノ角ゴ ProN W3" charset="0"/>
               </a:rPr>
@@ -5040,7 +5098,7 @@
           </a:p>
           <a:p>
             <a:r>
-              <a:rPr lang="en-US" dirty="0" smtClean="0">
+              <a:rPr lang="en-US" dirty="0">
                 <a:ea typeface="ヒラギノ角ゴ ProN W3" charset="0"/>
                 <a:cs typeface="ヒラギノ角ゴ ProN W3" charset="0"/>
               </a:rPr>
@@ -5059,21 +5117,6 @@
   <p:clrMapOvr>
     <a:masterClrMapping/>
   </p:clrMapOvr>
-  <mc:AlternateContent xmlns:mc="http://schemas.openxmlformats.org/markup-compatibility/2006" xmlns:p14="http://schemas.microsoft.com/office/powerpoint/2010/main">
-    <mc:Choice Requires="p14">
-      <p:transition spd="slow" p14:dur="2000"/>
-    </mc:Choice>
-    <mc:Fallback xmlns="">
-      <p:transition xmlns:p14="http://schemas.microsoft.com/office/powerpoint/2010/main" spd="slow"/>
-    </mc:Fallback>
-  </mc:AlternateContent>
-  <p:timing>
-    <p:tnLst>
-      <p:par>
-        <p:cTn xmlns:p14="http://schemas.microsoft.com/office/powerpoint/2010/main" id="1" dur="indefinite" restart="never" nodeType="tmRoot"/>
-      </p:par>
-    </p:tnLst>
-  </p:timing>
 </p:sld>
 </file>
 
@@ -5134,10 +5177,9 @@
           <a:lstStyle/>
           <a:p>
             <a:r>
-              <a:rPr lang="en-US" dirty="0" smtClean="0"/>
+              <a:rPr lang="en-US" dirty="0"/>
               <a:t>Original 2008 Google Paper</a:t>
             </a:r>
-            <a:endParaRPr lang="en-US" dirty="0"/>
           </a:p>
         </p:txBody>
       </p:sp>
@@ -5151,13 +5193,6 @@
   <p:clrMapOvr>
     <a:masterClrMapping/>
   </p:clrMapOvr>
-  <p:timing>
-    <p:tnLst>
-      <p:par>
-        <p:cTn xmlns:p14="http://schemas.microsoft.com/office/powerpoint/2010/main" id="1" dur="indefinite" restart="never" nodeType="tmRoot"/>
-      </p:par>
-    </p:tnLst>
-  </p:timing>
 </p:sld>
 </file>
 
@@ -5194,10 +5229,9 @@
           <a:lstStyle/>
           <a:p>
             <a:r>
-              <a:rPr lang="en-US" dirty="0" smtClean="0"/>
+              <a:rPr lang="en-US" dirty="0"/>
               <a:t>Yahoo 2007</a:t>
             </a:r>
-            <a:endParaRPr lang="en-US" dirty="0"/>
           </a:p>
         </p:txBody>
       </p:sp>
@@ -5235,13 +5269,6 @@
   <p:clrMapOvr>
     <a:masterClrMapping/>
   </p:clrMapOvr>
-  <p:timing>
-    <p:tnLst>
-      <p:par>
-        <p:cTn xmlns:p14="http://schemas.microsoft.com/office/powerpoint/2010/main" id="1" dur="indefinite" restart="never" nodeType="tmRoot"/>
-      </p:par>
-    </p:tnLst>
-  </p:timing>
 </p:sld>
 </file>
 
@@ -5278,44 +5305,42 @@
           <a:lstStyle/>
           <a:p>
             <a:r>
-              <a:rPr lang="en-US" dirty="0" smtClean="0"/>
+              <a:rPr lang="en-US" dirty="0"/>
               <a:t>Class Exercise</a:t>
             </a:r>
+          </a:p>
+        </p:txBody>
+      </p:sp>
+      <p:sp>
+        <p:nvSpPr>
+          <p:cNvPr id="3" name="Content Placeholder 2"/>
+          <p:cNvSpPr>
+            <a:spLocks noGrp="1"/>
+          </p:cNvSpPr>
+          <p:nvPr>
+            <p:ph idx="1"/>
+          </p:nvPr>
+        </p:nvSpPr>
+        <p:spPr/>
+        <p:txBody>
+          <a:bodyPr/>
+          <a:lstStyle/>
+          <a:p>
+            <a:r>
+              <a:rPr lang="en-US" dirty="0"/>
+              <a:t>Find a small piece of paper and write your university and day/month of birth on </a:t>
+            </a:r>
+            <a:r>
+              <a:rPr lang="en-US" b="1" dirty="0"/>
+              <a:t>one. </a:t>
+            </a:r>
             <a:endParaRPr lang="en-US" dirty="0"/>
           </a:p>
-        </p:txBody>
-      </p:sp>
-      <p:sp>
-        <p:nvSpPr>
-          <p:cNvPr id="3" name="Content Placeholder 2"/>
-          <p:cNvSpPr>
-            <a:spLocks noGrp="1"/>
-          </p:cNvSpPr>
-          <p:nvPr>
-            <p:ph idx="1"/>
-          </p:nvPr>
-        </p:nvSpPr>
-        <p:spPr/>
-        <p:txBody>
-          <a:bodyPr/>
-          <a:lstStyle/>
-          <a:p>
-            <a:r>
-              <a:rPr lang="en-US" dirty="0" smtClean="0"/>
-              <a:t>Find a small piece of paper and write your university and day/month of birth on </a:t>
-            </a:r>
-            <a:r>
-              <a:rPr lang="en-US" b="1" dirty="0" smtClean="0"/>
-              <a:t>one. </a:t>
-            </a:r>
-            <a:endParaRPr lang="en-US" dirty="0" smtClean="0"/>
-          </a:p>
-          <a:p>
-            <a:r>
-              <a:rPr lang="en-US" dirty="0" smtClean="0"/>
+          <a:p>
+            <a:r>
+              <a:rPr lang="en-US" dirty="0"/>
               <a:t>You don’t need the year</a:t>
             </a:r>
-            <a:endParaRPr lang="en-US" dirty="0"/>
           </a:p>
         </p:txBody>
       </p:sp>
@@ -5366,7 +5391,7 @@
           <a:p>
             <a:pPr algn="ctr"/>
             <a:r>
-              <a:rPr lang="en-US" sz="3600" dirty="0" smtClean="0">
+              <a:rPr lang="en-US" sz="3600" dirty="0">
                 <a:solidFill>
                   <a:schemeClr val="tx1"/>
                 </a:solidFill>
@@ -5374,41 +5399,20 @@
               <a:t>Portsmouth</a:t>
             </a:r>
             <a:br>
-              <a:rPr lang="en-US" sz="3600" dirty="0" smtClean="0">
+              <a:rPr lang="en-US" sz="3600" dirty="0">
                 <a:solidFill>
                   <a:schemeClr val="tx1"/>
                 </a:solidFill>
               </a:rPr>
             </a:br>
             <a:r>
-              <a:rPr lang="en-US" sz="3600" dirty="0" smtClean="0">
-                <a:solidFill>
-                  <a:schemeClr val="tx1"/>
-                </a:solidFill>
-              </a:rPr>
-              <a:t>5</a:t>
-            </a:r>
-            <a:r>
               <a:rPr lang="en-US" sz="3600" dirty="0">
                 <a:solidFill>
                   <a:schemeClr val="tx1"/>
                 </a:solidFill>
               </a:rPr>
-              <a:t> </a:t>
-            </a:r>
-            <a:r>
-              <a:rPr lang="en-US" sz="3600" dirty="0" smtClean="0">
-                <a:solidFill>
-                  <a:schemeClr val="tx1"/>
-                </a:solidFill>
-              </a:rPr>
-              <a:t>October</a:t>
-            </a:r>
-            <a:endParaRPr lang="en-US" sz="3600" dirty="0">
-              <a:solidFill>
-                <a:schemeClr val="tx1"/>
-              </a:solidFill>
-            </a:endParaRPr>
+              <a:t>5 October</a:t>
+            </a:r>
           </a:p>
         </p:txBody>
       </p:sp>
@@ -5422,13 +5426,6 @@
   <p:clrMapOvr>
     <a:masterClrMapping/>
   </p:clrMapOvr>
-  <p:timing>
-    <p:tnLst>
-      <p:par>
-        <p:cTn xmlns:p14="http://schemas.microsoft.com/office/powerpoint/2010/main" id="1" dur="indefinite" restart="never" nodeType="tmRoot"/>
-      </p:par>
-    </p:tnLst>
-  </p:timing>
 </p:sld>
 </file>
 
@@ -5465,10 +5462,9 @@
           <a:lstStyle/>
           <a:p>
             <a:r>
-              <a:rPr lang="en-US" dirty="0" smtClean="0"/>
+              <a:rPr lang="en-US" dirty="0"/>
               <a:t>Pictorially</a:t>
             </a:r>
-            <a:endParaRPr lang="en-US" dirty="0"/>
           </a:p>
         </p:txBody>
       </p:sp>
@@ -5506,13 +5502,6 @@
   <p:clrMapOvr>
     <a:masterClrMapping/>
   </p:clrMapOvr>
-  <p:timing>
-    <p:tnLst>
-      <p:par>
-        <p:cTn xmlns:p14="http://schemas.microsoft.com/office/powerpoint/2010/main" id="1" dur="indefinite" restart="never" nodeType="tmRoot"/>
-      </p:par>
-    </p:tnLst>
-  </p:timing>
 </p:sld>
 </file>
 
@@ -5551,14 +5540,14 @@
           <a:lstStyle/>
           <a:p>
             <a:r>
-              <a:rPr lang="en-US" dirty="0" smtClean="0"/>
+              <a:rPr lang="en-US" dirty="0"/>
               <a:t>Google’s early use of MR</a:t>
             </a:r>
             <a:br>
-              <a:rPr lang="en-US" dirty="0" smtClean="0"/>
+              <a:rPr lang="en-US" dirty="0"/>
             </a:br>
             <a:r>
-              <a:rPr lang="en-US" sz="2700" dirty="0" smtClean="0"/>
+              <a:rPr lang="en-US" sz="2700" dirty="0"/>
               <a:t>Map Reduce programs in their code repository</a:t>
             </a:r>
             <a:endParaRPr lang="en-US" dirty="0"/>
@@ -5637,71 +5626,62 @@
           <a:lstStyle/>
           <a:p>
             <a:r>
-              <a:rPr lang="en-US" dirty="0" smtClean="0"/>
+              <a:rPr lang="en-US" dirty="0"/>
               <a:t>Map Reduce example</a:t>
             </a:r>
             <a:br>
-              <a:rPr lang="en-US" dirty="0" smtClean="0"/>
+              <a:rPr lang="en-US" dirty="0"/>
             </a:br>
             <a:r>
-              <a:rPr lang="en-US" dirty="0" smtClean="0"/>
+              <a:rPr lang="en-US" dirty="0"/>
               <a:t>in words</a:t>
             </a:r>
+          </a:p>
+        </p:txBody>
+      </p:sp>
+      <p:sp>
+        <p:nvSpPr>
+          <p:cNvPr id="3" name="Content Placeholder 2"/>
+          <p:cNvSpPr>
+            <a:spLocks noGrp="1"/>
+          </p:cNvSpPr>
+          <p:nvPr>
+            <p:ph idx="1"/>
+          </p:nvPr>
+        </p:nvSpPr>
+        <p:spPr/>
+        <p:txBody>
+          <a:bodyPr/>
+          <a:lstStyle/>
+          <a:p>
+            <a:r>
+              <a:rPr lang="en-US" dirty="0"/>
+              <a:t>Do a word count on 1000 books:</a:t>
+            </a:r>
+          </a:p>
+          <a:p>
             <a:endParaRPr lang="en-US" dirty="0"/>
           </a:p>
-        </p:txBody>
-      </p:sp>
-      <p:sp>
-        <p:nvSpPr>
-          <p:cNvPr id="3" name="Content Placeholder 2"/>
-          <p:cNvSpPr>
-            <a:spLocks noGrp="1"/>
-          </p:cNvSpPr>
-          <p:nvPr>
-            <p:ph idx="1"/>
-          </p:nvPr>
-        </p:nvSpPr>
-        <p:spPr/>
-        <p:txBody>
-          <a:bodyPr/>
-          <a:lstStyle/>
-          <a:p>
-            <a:r>
-              <a:rPr lang="en-US" dirty="0" smtClean="0"/>
-              <a:t>Do a word count on 1000 books:</a:t>
-            </a:r>
-          </a:p>
-          <a:p>
-            <a:endParaRPr lang="en-US" dirty="0"/>
-          </a:p>
           <a:p>
             <a:pPr lvl="1"/>
             <a:r>
-              <a:rPr lang="en-US" dirty="0" smtClean="0"/>
-              <a:t>First count each book</a:t>
+              <a:rPr lang="en-US" dirty="0"/>
+              <a:t>First count each book (</a:t>
+            </a:r>
+            <a:r>
+              <a:rPr lang="en-US" b="1" dirty="0"/>
+              <a:t>map</a:t>
             </a:r>
             <a:r>
               <a:rPr lang="en-US" dirty="0"/>
               <a:t> </a:t>
             </a:r>
             <a:r>
-              <a:rPr lang="en-US" dirty="0" smtClean="0"/>
-              <a:t>(</a:t>
-            </a:r>
-            <a:r>
-              <a:rPr lang="en-US" b="1" dirty="0" smtClean="0"/>
-              <a:t>map</a:t>
-            </a:r>
-            <a:r>
-              <a:rPr lang="en-US" dirty="0" smtClean="0"/>
-              <a:t> </a:t>
-            </a:r>
-            <a:r>
-              <a:rPr lang="en-US" dirty="0" err="1" smtClean="0"/>
+              <a:rPr lang="en-US" dirty="0" err="1"/>
               <a:t>wc</a:t>
             </a:r>
             <a:r>
-              <a:rPr lang="en-US" dirty="0" smtClean="0"/>
+              <a:rPr lang="en-US" dirty="0"/>
               <a:t> onto book)</a:t>
             </a:r>
           </a:p>
@@ -5712,29 +5692,29 @@
           <a:p>
             <a:pPr lvl="1"/>
             <a:r>
-              <a:rPr lang="en-US" dirty="0" smtClean="0"/>
+              <a:rPr lang="en-US" dirty="0"/>
               <a:t>Then </a:t>
             </a:r>
             <a:r>
-              <a:rPr lang="en-US" b="1" dirty="0" smtClean="0"/>
+              <a:rPr lang="en-US" b="1" dirty="0"/>
               <a:t>reduce</a:t>
             </a:r>
             <a:r>
-              <a:rPr lang="en-US" dirty="0" smtClean="0"/>
+              <a:rPr lang="en-US" dirty="0"/>
               <a:t> the outputs to a global </a:t>
             </a:r>
             <a:r>
-              <a:rPr lang="en-US" dirty="0" err="1" smtClean="0"/>
+              <a:rPr lang="en-US" dirty="0" err="1"/>
               <a:t>wordcount</a:t>
             </a:r>
             <a:r>
-              <a:rPr lang="en-US" dirty="0" smtClean="0"/>
+              <a:rPr lang="en-US" dirty="0"/>
               <a:t> across all books</a:t>
             </a:r>
           </a:p>
           <a:p>
             <a:pPr lvl="2"/>
-            <a:endParaRPr lang="en-US" dirty="0" smtClean="0"/>
+            <a:endParaRPr lang="en-US" dirty="0"/>
           </a:p>
         </p:txBody>
       </p:sp>
@@ -5786,10 +5766,9 @@
           <a:lstStyle/>
           <a:p>
             <a:r>
-              <a:rPr lang="en-US" dirty="0" smtClean="0"/>
+              <a:rPr lang="en-US" dirty="0"/>
               <a:t>Efficiency</a:t>
             </a:r>
-            <a:endParaRPr lang="en-US" dirty="0"/>
           </a:p>
         </p:txBody>
       </p:sp>
@@ -5811,45 +5790,45 @@
           <a:lstStyle/>
           <a:p>
             <a:r>
-              <a:rPr lang="en-US" dirty="0" smtClean="0"/>
+              <a:rPr lang="en-US" dirty="0"/>
               <a:t>Reduce phase:</a:t>
             </a:r>
           </a:p>
           <a:p>
             <a:pPr lvl="1"/>
             <a:r>
-              <a:rPr lang="en-US" dirty="0" smtClean="0"/>
+              <a:rPr lang="en-US" dirty="0"/>
               <a:t>We can theoretically process each word in parallel</a:t>
             </a:r>
           </a:p>
           <a:p>
             <a:pPr lvl="1"/>
-            <a:endParaRPr lang="en-US" dirty="0" smtClean="0"/>
-          </a:p>
-          <a:p>
-            <a:r>
-              <a:rPr lang="en-US" dirty="0" smtClean="0"/>
+            <a:endParaRPr lang="en-US" dirty="0"/>
+          </a:p>
+          <a:p>
+            <a:r>
+              <a:rPr lang="en-US" dirty="0"/>
               <a:t>How?</a:t>
             </a:r>
           </a:p>
           <a:p>
             <a:pPr lvl="1"/>
             <a:r>
-              <a:rPr lang="en-US" dirty="0" smtClean="0"/>
+              <a:rPr lang="en-US" dirty="0"/>
               <a:t>Shuffle / Sort the results from the map phase by key (word)</a:t>
             </a:r>
           </a:p>
           <a:p>
             <a:pPr lvl="1"/>
             <a:r>
-              <a:rPr lang="en-US" dirty="0" smtClean="0"/>
+              <a:rPr lang="en-US" dirty="0"/>
               <a:t>Partition by keys</a:t>
             </a:r>
           </a:p>
           <a:p>
             <a:pPr lvl="1"/>
             <a:r>
-              <a:rPr lang="en-US" dirty="0" smtClean="0"/>
+              <a:rPr lang="en-US" dirty="0"/>
               <a:t>Parallelize the reduce phase</a:t>
             </a:r>
           </a:p>

</xml_diff>

<commit_message>
latest changes to exercise 5
</commit_message>
<xml_diff>
--- a/pres-source/02-map-reduce.pptx
+++ b/pres-source/02-map-reduce.pptx
@@ -253,7 +253,7 @@
             <a:fld id="{7307762F-A706-E543-A832-3C298AA3103F}" type="datetimeFigureOut">
               <a:rPr lang="en-US" smtClean="0"/>
               <a:pPr/>
-              <a:t>2/9/19</a:t>
+              <a:t>2/19/19</a:t>
             </a:fld>
             <a:endParaRPr lang="en-US" dirty="0"/>
           </a:p>
@@ -903,7 +903,7 @@
           <a:p>
             <a:fld id="{875CF0EB-321F-0749-B37A-89BBA859503C}" type="datetimeFigureOut">
               <a:rPr lang="en-US" smtClean="0"/>
-              <a:t>2/9/19</a:t>
+              <a:t>2/19/19</a:t>
             </a:fld>
             <a:endParaRPr lang="en-US"/>
           </a:p>
@@ -1105,7 +1105,7 @@
           <a:p>
             <a:fld id="{875CF0EB-321F-0749-B37A-89BBA859503C}" type="datetimeFigureOut">
               <a:rPr lang="en-US" smtClean="0"/>
-              <a:t>2/9/19</a:t>
+              <a:t>2/19/19</a:t>
             </a:fld>
             <a:endParaRPr lang="en-US"/>
           </a:p>
@@ -1297,7 +1297,7 @@
           <a:p>
             <a:fld id="{875CF0EB-321F-0749-B37A-89BBA859503C}" type="datetimeFigureOut">
               <a:rPr lang="en-US" smtClean="0"/>
-              <a:t>2/9/19</a:t>
+              <a:t>2/19/19</a:t>
             </a:fld>
             <a:endParaRPr lang="en-US"/>
           </a:p>
@@ -1566,7 +1566,7 @@
           <a:p>
             <a:fld id="{875CF0EB-321F-0749-B37A-89BBA859503C}" type="datetimeFigureOut">
               <a:rPr lang="en-US" smtClean="0"/>
-              <a:t>2/9/19</a:t>
+              <a:t>2/19/19</a:t>
             </a:fld>
             <a:endParaRPr lang="en-US"/>
           </a:p>
@@ -1875,7 +1875,7 @@
           <a:p>
             <a:fld id="{875CF0EB-321F-0749-B37A-89BBA859503C}" type="datetimeFigureOut">
               <a:rPr lang="en-US" smtClean="0"/>
-              <a:t>2/9/19</a:t>
+              <a:t>2/19/19</a:t>
             </a:fld>
             <a:endParaRPr lang="en-US"/>
           </a:p>
@@ -2318,7 +2318,7 @@
           <a:p>
             <a:fld id="{875CF0EB-321F-0749-B37A-89BBA859503C}" type="datetimeFigureOut">
               <a:rPr lang="en-US" smtClean="0"/>
-              <a:t>2/9/19</a:t>
+              <a:t>2/19/19</a:t>
             </a:fld>
             <a:endParaRPr lang="en-US"/>
           </a:p>
@@ -2459,7 +2459,7 @@
           <a:p>
             <a:fld id="{875CF0EB-321F-0749-B37A-89BBA859503C}" type="datetimeFigureOut">
               <a:rPr lang="en-US" smtClean="0"/>
-              <a:t>2/9/19</a:t>
+              <a:t>2/19/19</a:t>
             </a:fld>
             <a:endParaRPr lang="en-US"/>
           </a:p>
@@ -2578,7 +2578,7 @@
           <a:p>
             <a:fld id="{875CF0EB-321F-0749-B37A-89BBA859503C}" type="datetimeFigureOut">
               <a:rPr lang="en-US" smtClean="0"/>
-              <a:t>2/9/19</a:t>
+              <a:t>2/19/19</a:t>
             </a:fld>
             <a:endParaRPr lang="en-US"/>
           </a:p>
@@ -2877,7 +2877,7 @@
           <a:p>
             <a:fld id="{875CF0EB-321F-0749-B37A-89BBA859503C}" type="datetimeFigureOut">
               <a:rPr lang="en-US" smtClean="0"/>
-              <a:t>2/9/19</a:t>
+              <a:t>2/19/19</a:t>
             </a:fld>
             <a:endParaRPr lang="en-US"/>
           </a:p>
@@ -3153,7 +3153,7 @@
           <a:p>
             <a:fld id="{875CF0EB-321F-0749-B37A-89BBA859503C}" type="datetimeFigureOut">
               <a:rPr lang="en-US" smtClean="0"/>
-              <a:t>2/9/19</a:t>
+              <a:t>2/19/19</a:t>
             </a:fld>
             <a:endParaRPr lang="en-US"/>
           </a:p>
@@ -3367,14 +3367,14 @@
           </a:ln>
           <a:extLst>
             <a:ext uri="{909E8E84-426E-40dd-AFC4-6F175D3DCCD1}">
-              <a14:hiddenFill xmlns="" xmlns:a14="http://schemas.microsoft.com/office/drawing/2010/main">
+              <a14:hiddenFill xmlns:a14="http://schemas.microsoft.com/office/drawing/2010/main" xmlns="">
                 <a:solidFill>
                   <a:srgbClr val="FFFFFF"/>
                 </a:solidFill>
               </a14:hiddenFill>
             </a:ext>
             <a:ext uri="{91240B29-F687-4f45-9708-019B960494DF}">
-              <a14:hiddenLine xmlns="" xmlns:a14="http://schemas.microsoft.com/office/drawing/2010/main" w="9525">
+              <a14:hiddenLine xmlns:a14="http://schemas.microsoft.com/office/drawing/2010/main" xmlns="" w="9525">
                 <a:solidFill>
                   <a:srgbClr val="000000"/>
                 </a:solidFill>
@@ -3928,14 +3928,14 @@
           <a:noFill/>
           <a:extLst>
             <a:ext uri="{909E8E84-426E-40dd-AFC4-6F175D3DCCD1}">
-              <a14:hiddenFill xmlns="" xmlns:a14="http://schemas.microsoft.com/office/drawing/2010/main">
+              <a14:hiddenFill xmlns:a14="http://schemas.microsoft.com/office/drawing/2010/main" xmlns="">
                 <a:solidFill>
                   <a:srgbClr val="FFFFFF"/>
                 </a:solidFill>
               </a14:hiddenFill>
             </a:ext>
             <a:ext uri="{91240B29-F687-4f45-9708-019B960494DF}">
-              <a14:hiddenLine xmlns="" xmlns:a14="http://schemas.microsoft.com/office/drawing/2010/main" w="9525">
+              <a14:hiddenLine xmlns:a14="http://schemas.microsoft.com/office/drawing/2010/main" xmlns="" w="9525">
                 <a:solidFill>
                   <a:srgbClr val="000000"/>
                 </a:solidFill>
@@ -6020,14 +6020,14 @@
           <a:noFill/>
           <a:extLst>
             <a:ext uri="{909E8E84-426E-40dd-AFC4-6F175D3DCCD1}">
-              <a14:hiddenFill xmlns="" xmlns:a14="http://schemas.microsoft.com/office/drawing/2010/main">
+              <a14:hiddenFill xmlns:a14="http://schemas.microsoft.com/office/drawing/2010/main" xmlns="">
                 <a:solidFill>
                   <a:srgbClr val="FFFFFF"/>
                 </a:solidFill>
               </a14:hiddenFill>
             </a:ext>
             <a:ext uri="{91240B29-F687-4f45-9708-019B960494DF}">
-              <a14:hiddenLine xmlns="" xmlns:a14="http://schemas.microsoft.com/office/drawing/2010/main" w="9525">
+              <a14:hiddenLine xmlns:a14="http://schemas.microsoft.com/office/drawing/2010/main" xmlns="" w="9525">
                 <a:solidFill>
                   <a:srgbClr val="000000"/>
                 </a:solidFill>
@@ -6071,14 +6071,14 @@
           <a:noFill/>
           <a:extLst>
             <a:ext uri="{909E8E84-426E-40dd-AFC4-6F175D3DCCD1}">
-              <a14:hiddenFill xmlns="" xmlns:a14="http://schemas.microsoft.com/office/drawing/2010/main">
+              <a14:hiddenFill xmlns:a14="http://schemas.microsoft.com/office/drawing/2010/main" xmlns="">
                 <a:solidFill>
                   <a:srgbClr val="FFFFFF"/>
                 </a:solidFill>
               </a14:hiddenFill>
             </a:ext>
             <a:ext uri="{91240B29-F687-4f45-9708-019B960494DF}">
-              <a14:hiddenLine xmlns="" xmlns:a14="http://schemas.microsoft.com/office/drawing/2010/main" w="9525">
+              <a14:hiddenLine xmlns:a14="http://schemas.microsoft.com/office/drawing/2010/main" xmlns="" w="9525">
                 <a:solidFill>
                   <a:srgbClr val="000000"/>
                 </a:solidFill>
@@ -10301,10 +10301,10 @@
             <a:endParaRPr lang="en-US" dirty="0"/>
           </a:p>
           <a:p>
-            <a:r>
-              <a:rPr lang="en-US" dirty="0"/>
-              <a:t>HDFS</a:t>
-            </a:r>
+            <a:pPr marL="0" indent="0">
+              <a:buNone/>
+            </a:pPr>
+            <a:endParaRPr lang="en-US" dirty="0"/>
           </a:p>
         </p:txBody>
       </p:sp>

</xml_diff>